<commit_message>
Upgraded Project File to PBIR format
</commit_message>
<xml_diff>
--- a/Austin Background - With Cover Page & Project Image.pptx
+++ b/Austin Background - With Cover Page & Project Image.pptx
@@ -113,6 +113,14 @@
     </p:ext>
   </p:extLst>
 </p:presentation>
+</file>
+
+<file path=ppt/revisionInfo.xml><?xml version="1.0" encoding="utf-8"?>
+<p1510:revInfo xmlns:a="http://schemas.openxmlformats.org/drawingml/2006/main" xmlns:r="http://schemas.openxmlformats.org/officeDocument/2006/relationships" xmlns:p1510="http://schemas.microsoft.com/office/powerpoint/2015/10/main">
+  <p1510:revLst>
+    <p1510:client id="{D55794B6-DE28-48AB-88A1-4D115DE6BAB4}" v="5" dt="2024-09-30T07:33:49.372"/>
+  </p1510:revLst>
+</p1510:revInfo>
 </file>
 
 <file path=ppt/changesInfos/changesInfo1.xml><?xml version="1.0" encoding="utf-8"?>
@@ -346,6 +354,117 @@
       </pc:sldChg>
     </pc:docChg>
   </pc:docChgLst>
+  <pc:docChgLst>
+    <pc:chgData name="Andrew" userId="36c5b73e-58a9-45e0-b191-7481baa14d1c" providerId="ADAL" clId="{D55794B6-DE28-48AB-88A1-4D115DE6BAB4}"/>
+    <pc:docChg chg="custSel modSld">
+      <pc:chgData name="Andrew" userId="36c5b73e-58a9-45e0-b191-7481baa14d1c" providerId="ADAL" clId="{D55794B6-DE28-48AB-88A1-4D115DE6BAB4}" dt="2024-10-09T06:28:31.165" v="25" actId="1076"/>
+      <pc:docMkLst>
+        <pc:docMk/>
+      </pc:docMkLst>
+      <pc:sldChg chg="addSp modSp mod">
+        <pc:chgData name="Andrew" userId="36c5b73e-58a9-45e0-b191-7481baa14d1c" providerId="ADAL" clId="{D55794B6-DE28-48AB-88A1-4D115DE6BAB4}" dt="2024-09-28T09:02:19.645" v="21" actId="207"/>
+        <pc:sldMkLst>
+          <pc:docMk/>
+          <pc:sldMk cId="859268429" sldId="256"/>
+        </pc:sldMkLst>
+        <pc:spChg chg="add mod">
+          <ac:chgData name="Andrew" userId="36c5b73e-58a9-45e0-b191-7481baa14d1c" providerId="ADAL" clId="{D55794B6-DE28-48AB-88A1-4D115DE6BAB4}" dt="2024-09-28T09:02:08.242" v="20" actId="1076"/>
+          <ac:spMkLst>
+            <pc:docMk/>
+            <pc:sldMk cId="859268429" sldId="256"/>
+            <ac:spMk id="2" creationId="{D1C711DF-4FCF-470E-A3EE-D2BF17979640}"/>
+          </ac:spMkLst>
+        </pc:spChg>
+        <pc:spChg chg="add mod">
+          <ac:chgData name="Andrew" userId="36c5b73e-58a9-45e0-b191-7481baa14d1c" providerId="ADAL" clId="{D55794B6-DE28-48AB-88A1-4D115DE6BAB4}" dt="2024-09-28T09:01:35.427" v="13" actId="207"/>
+          <ac:spMkLst>
+            <pc:docMk/>
+            <pc:sldMk cId="859268429" sldId="256"/>
+            <ac:spMk id="3" creationId="{0ED25745-4968-7F83-4E02-000253EF6717}"/>
+          </ac:spMkLst>
+        </pc:spChg>
+        <pc:spChg chg="add mod">
+          <ac:chgData name="Andrew" userId="36c5b73e-58a9-45e0-b191-7481baa14d1c" providerId="ADAL" clId="{D55794B6-DE28-48AB-88A1-4D115DE6BAB4}" dt="2024-09-28T09:02:19.645" v="21" actId="207"/>
+          <ac:spMkLst>
+            <pc:docMk/>
+            <pc:sldMk cId="859268429" sldId="256"/>
+            <ac:spMk id="4" creationId="{13765F06-AF94-D6FA-CF03-FCD026C9819D}"/>
+          </ac:spMkLst>
+        </pc:spChg>
+        <pc:spChg chg="add mod">
+          <ac:chgData name="Andrew" userId="36c5b73e-58a9-45e0-b191-7481baa14d1c" providerId="ADAL" clId="{D55794B6-DE28-48AB-88A1-4D115DE6BAB4}" dt="2024-09-28T09:01:42.558" v="15" actId="207"/>
+          <ac:spMkLst>
+            <pc:docMk/>
+            <pc:sldMk cId="859268429" sldId="256"/>
+            <ac:spMk id="5" creationId="{EEBD08A2-D0D8-E563-BDFA-2D93F8CF1BE6}"/>
+          </ac:spMkLst>
+        </pc:spChg>
+        <pc:spChg chg="add mod">
+          <ac:chgData name="Andrew" userId="36c5b73e-58a9-45e0-b191-7481baa14d1c" providerId="ADAL" clId="{D55794B6-DE28-48AB-88A1-4D115DE6BAB4}" dt="2024-09-28T09:01:47.490" v="16" actId="207"/>
+          <ac:spMkLst>
+            <pc:docMk/>
+            <pc:sldMk cId="859268429" sldId="256"/>
+            <ac:spMk id="6" creationId="{E5F42BF5-523E-9E4F-1351-870F9CB9D30B}"/>
+          </ac:spMkLst>
+        </pc:spChg>
+        <pc:spChg chg="add mod">
+          <ac:chgData name="Andrew" userId="36c5b73e-58a9-45e0-b191-7481baa14d1c" providerId="ADAL" clId="{D55794B6-DE28-48AB-88A1-4D115DE6BAB4}" dt="2024-09-28T09:01:52.074" v="17" actId="207"/>
+          <ac:spMkLst>
+            <pc:docMk/>
+            <pc:sldMk cId="859268429" sldId="256"/>
+            <ac:spMk id="7" creationId="{AD9FDAD2-09A9-AC56-613F-AA84467F7A8C}"/>
+          </ac:spMkLst>
+        </pc:spChg>
+        <pc:spChg chg="add mod">
+          <ac:chgData name="Andrew" userId="36c5b73e-58a9-45e0-b191-7481baa14d1c" providerId="ADAL" clId="{D55794B6-DE28-48AB-88A1-4D115DE6BAB4}" dt="2024-09-28T09:01:59.109" v="18" actId="207"/>
+          <ac:spMkLst>
+            <pc:docMk/>
+            <pc:sldMk cId="859268429" sldId="256"/>
+            <ac:spMk id="8" creationId="{E008B1CF-FBB0-8ABA-4366-BC70FDEA408A}"/>
+          </ac:spMkLst>
+        </pc:spChg>
+        <pc:spChg chg="add mod">
+          <ac:chgData name="Andrew" userId="36c5b73e-58a9-45e0-b191-7481baa14d1c" providerId="ADAL" clId="{D55794B6-DE28-48AB-88A1-4D115DE6BAB4}" dt="2024-09-28T09:02:03.910" v="19" actId="207"/>
+          <ac:spMkLst>
+            <pc:docMk/>
+            <pc:sldMk cId="859268429" sldId="256"/>
+            <ac:spMk id="10" creationId="{D1D81ADB-0DFD-BD29-2781-E22C6040DD2E}"/>
+          </ac:spMkLst>
+        </pc:spChg>
+      </pc:sldChg>
+      <pc:sldChg chg="addSp delSp modSp mod">
+        <pc:chgData name="Andrew" userId="36c5b73e-58a9-45e0-b191-7481baa14d1c" providerId="ADAL" clId="{D55794B6-DE28-48AB-88A1-4D115DE6BAB4}" dt="2024-10-09T06:28:31.165" v="25" actId="1076"/>
+        <pc:sldMkLst>
+          <pc:docMk/>
+          <pc:sldMk cId="3192043026" sldId="258"/>
+        </pc:sldMkLst>
+        <pc:spChg chg="add del mod">
+          <ac:chgData name="Andrew" userId="36c5b73e-58a9-45e0-b191-7481baa14d1c" providerId="ADAL" clId="{D55794B6-DE28-48AB-88A1-4D115DE6BAB4}" dt="2024-09-30T07:33:51.083" v="24" actId="21"/>
+          <ac:spMkLst>
+            <pc:docMk/>
+            <pc:sldMk cId="3192043026" sldId="258"/>
+            <ac:spMk id="2" creationId="{29008294-C16F-BDDE-626C-ACF3A195C45E}"/>
+          </ac:spMkLst>
+        </pc:spChg>
+        <pc:spChg chg="mod">
+          <ac:chgData name="Andrew" userId="36c5b73e-58a9-45e0-b191-7481baa14d1c" providerId="ADAL" clId="{D55794B6-DE28-48AB-88A1-4D115DE6BAB4}" dt="2024-09-30T07:33:12.787" v="22" actId="1076"/>
+          <ac:spMkLst>
+            <pc:docMk/>
+            <pc:sldMk cId="3192043026" sldId="258"/>
+            <ac:spMk id="9" creationId="{D1C1A60D-C61C-2EBD-3950-A572B3272E55}"/>
+          </ac:spMkLst>
+        </pc:spChg>
+        <pc:spChg chg="mod">
+          <ac:chgData name="Andrew" userId="36c5b73e-58a9-45e0-b191-7481baa14d1c" providerId="ADAL" clId="{D55794B6-DE28-48AB-88A1-4D115DE6BAB4}" dt="2024-10-09T06:28:31.165" v="25" actId="1076"/>
+          <ac:spMkLst>
+            <pc:docMk/>
+            <pc:sldMk cId="3192043026" sldId="258"/>
+            <ac:spMk id="16" creationId="{F0CA18E2-A97C-40D1-821E-E8F8EFF27793}"/>
+          </ac:spMkLst>
+        </pc:spChg>
+      </pc:sldChg>
+    </pc:docChg>
+  </pc:docChgLst>
 </pc:chgInfo>
 </file>
 
@@ -496,7 +615,7 @@
           <a:p>
             <a:fld id="{3E4378F7-4ECC-43AB-A37F-B308BBA0A23C}" type="datetimeFigureOut">
               <a:rPr lang="en-GB" smtClean="0"/>
-              <a:t>05/08/2024</a:t>
+              <a:t>09/10/2024</a:t>
             </a:fld>
             <a:endParaRPr lang="en-GB"/>
           </a:p>
@@ -694,7 +813,7 @@
           <a:p>
             <a:fld id="{3E4378F7-4ECC-43AB-A37F-B308BBA0A23C}" type="datetimeFigureOut">
               <a:rPr lang="en-GB" smtClean="0"/>
-              <a:t>05/08/2024</a:t>
+              <a:t>09/10/2024</a:t>
             </a:fld>
             <a:endParaRPr lang="en-GB"/>
           </a:p>
@@ -902,7 +1021,7 @@
           <a:p>
             <a:fld id="{3E4378F7-4ECC-43AB-A37F-B308BBA0A23C}" type="datetimeFigureOut">
               <a:rPr lang="en-GB" smtClean="0"/>
-              <a:t>05/08/2024</a:t>
+              <a:t>09/10/2024</a:t>
             </a:fld>
             <a:endParaRPr lang="en-GB"/>
           </a:p>
@@ -1100,7 +1219,7 @@
           <a:p>
             <a:fld id="{3E4378F7-4ECC-43AB-A37F-B308BBA0A23C}" type="datetimeFigureOut">
               <a:rPr lang="en-GB" smtClean="0"/>
-              <a:t>05/08/2024</a:t>
+              <a:t>09/10/2024</a:t>
             </a:fld>
             <a:endParaRPr lang="en-GB"/>
           </a:p>
@@ -1375,7 +1494,7 @@
           <a:p>
             <a:fld id="{3E4378F7-4ECC-43AB-A37F-B308BBA0A23C}" type="datetimeFigureOut">
               <a:rPr lang="en-GB" smtClean="0"/>
-              <a:t>05/08/2024</a:t>
+              <a:t>09/10/2024</a:t>
             </a:fld>
             <a:endParaRPr lang="en-GB"/>
           </a:p>
@@ -1640,7 +1759,7 @@
           <a:p>
             <a:fld id="{3E4378F7-4ECC-43AB-A37F-B308BBA0A23C}" type="datetimeFigureOut">
               <a:rPr lang="en-GB" smtClean="0"/>
-              <a:t>05/08/2024</a:t>
+              <a:t>09/10/2024</a:t>
             </a:fld>
             <a:endParaRPr lang="en-GB"/>
           </a:p>
@@ -2052,7 +2171,7 @@
           <a:p>
             <a:fld id="{3E4378F7-4ECC-43AB-A37F-B308BBA0A23C}" type="datetimeFigureOut">
               <a:rPr lang="en-GB" smtClean="0"/>
-              <a:t>05/08/2024</a:t>
+              <a:t>09/10/2024</a:t>
             </a:fld>
             <a:endParaRPr lang="en-GB"/>
           </a:p>
@@ -2193,7 +2312,7 @@
           <a:p>
             <a:fld id="{3E4378F7-4ECC-43AB-A37F-B308BBA0A23C}" type="datetimeFigureOut">
               <a:rPr lang="en-GB" smtClean="0"/>
-              <a:t>05/08/2024</a:t>
+              <a:t>09/10/2024</a:t>
             </a:fld>
             <a:endParaRPr lang="en-GB"/>
           </a:p>
@@ -2306,7 +2425,7 @@
           <a:p>
             <a:fld id="{3E4378F7-4ECC-43AB-A37F-B308BBA0A23C}" type="datetimeFigureOut">
               <a:rPr lang="en-GB" smtClean="0"/>
-              <a:t>05/08/2024</a:t>
+              <a:t>09/10/2024</a:t>
             </a:fld>
             <a:endParaRPr lang="en-GB"/>
           </a:p>
@@ -2617,7 +2736,7 @@
           <a:p>
             <a:fld id="{3E4378F7-4ECC-43AB-A37F-B308BBA0A23C}" type="datetimeFigureOut">
               <a:rPr lang="en-GB" smtClean="0"/>
-              <a:t>05/08/2024</a:t>
+              <a:t>09/10/2024</a:t>
             </a:fld>
             <a:endParaRPr lang="en-GB"/>
           </a:p>
@@ -2905,7 +3024,7 @@
           <a:p>
             <a:fld id="{3E4378F7-4ECC-43AB-A37F-B308BBA0A23C}" type="datetimeFigureOut">
               <a:rPr lang="en-GB" smtClean="0"/>
-              <a:t>05/08/2024</a:t>
+              <a:t>09/10/2024</a:t>
             </a:fld>
             <a:endParaRPr lang="en-GB"/>
           </a:p>
@@ -3146,7 +3265,7 @@
           <a:p>
             <a:fld id="{3E4378F7-4ECC-43AB-A37F-B308BBA0A23C}" type="datetimeFigureOut">
               <a:rPr lang="en-GB" smtClean="0"/>
-              <a:t>05/08/2024</a:t>
+              <a:t>09/10/2024</a:t>
             </a:fld>
             <a:endParaRPr lang="en-GB"/>
           </a:p>
@@ -4398,6 +4517,398 @@
           </a:prstGeom>
         </p:spPr>
       </p:pic>
+      <p:sp>
+        <p:nvSpPr>
+          <p:cNvPr id="2" name="Rectangle 1">
+            <a:extLst>
+              <a:ext uri="{FF2B5EF4-FFF2-40B4-BE49-F238E27FC236}">
+                <a16:creationId xmlns:a16="http://schemas.microsoft.com/office/drawing/2014/main" id="{D1C711DF-4FCF-470E-A3EE-D2BF17979640}"/>
+              </a:ext>
+            </a:extLst>
+          </p:cNvPr>
+          <p:cNvSpPr/>
+          <p:nvPr/>
+        </p:nvSpPr>
+        <p:spPr>
+          <a:xfrm>
+            <a:off x="752317" y="1247288"/>
+            <a:ext cx="1834588" cy="1782501"/>
+          </a:xfrm>
+          <a:prstGeom prst="rect">
+            <a:avLst/>
+          </a:prstGeom>
+          <a:solidFill>
+            <a:schemeClr val="bg2"/>
+          </a:solidFill>
+        </p:spPr>
+        <p:style>
+          <a:lnRef idx="2">
+            <a:schemeClr val="accent1">
+              <a:shade val="15000"/>
+            </a:schemeClr>
+          </a:lnRef>
+          <a:fillRef idx="1">
+            <a:schemeClr val="accent1"/>
+          </a:fillRef>
+          <a:effectRef idx="0">
+            <a:schemeClr val="accent1"/>
+          </a:effectRef>
+          <a:fontRef idx="minor">
+            <a:schemeClr val="lt1"/>
+          </a:fontRef>
+        </p:style>
+        <p:txBody>
+          <a:bodyPr rtlCol="0" anchor="ctr"/>
+          <a:lstStyle/>
+          <a:p>
+            <a:pPr algn="ctr"/>
+            <a:endParaRPr lang="en-GB"/>
+          </a:p>
+        </p:txBody>
+      </p:sp>
+      <p:sp>
+        <p:nvSpPr>
+          <p:cNvPr id="3" name="Rectangle 2">
+            <a:extLst>
+              <a:ext uri="{FF2B5EF4-FFF2-40B4-BE49-F238E27FC236}">
+                <a16:creationId xmlns:a16="http://schemas.microsoft.com/office/drawing/2014/main" id="{0ED25745-4968-7F83-4E02-000253EF6717}"/>
+              </a:ext>
+            </a:extLst>
+          </p:cNvPr>
+          <p:cNvSpPr/>
+          <p:nvPr/>
+        </p:nvSpPr>
+        <p:spPr>
+          <a:xfrm>
+            <a:off x="3073053" y="1247288"/>
+            <a:ext cx="1834588" cy="1782501"/>
+          </a:xfrm>
+          <a:prstGeom prst="rect">
+            <a:avLst/>
+          </a:prstGeom>
+          <a:solidFill>
+            <a:schemeClr val="tx2"/>
+          </a:solidFill>
+        </p:spPr>
+        <p:style>
+          <a:lnRef idx="2">
+            <a:schemeClr val="accent1">
+              <a:shade val="15000"/>
+            </a:schemeClr>
+          </a:lnRef>
+          <a:fillRef idx="1">
+            <a:schemeClr val="accent1"/>
+          </a:fillRef>
+          <a:effectRef idx="0">
+            <a:schemeClr val="accent1"/>
+          </a:effectRef>
+          <a:fontRef idx="minor">
+            <a:schemeClr val="lt1"/>
+          </a:fontRef>
+        </p:style>
+        <p:txBody>
+          <a:bodyPr rtlCol="0" anchor="ctr"/>
+          <a:lstStyle/>
+          <a:p>
+            <a:pPr algn="ctr"/>
+            <a:endParaRPr lang="en-GB"/>
+          </a:p>
+        </p:txBody>
+      </p:sp>
+      <p:sp>
+        <p:nvSpPr>
+          <p:cNvPr id="4" name="Rectangle 3">
+            <a:extLst>
+              <a:ext uri="{FF2B5EF4-FFF2-40B4-BE49-F238E27FC236}">
+                <a16:creationId xmlns:a16="http://schemas.microsoft.com/office/drawing/2014/main" id="{13765F06-AF94-D6FA-CF03-FCD026C9819D}"/>
+              </a:ext>
+            </a:extLst>
+          </p:cNvPr>
+          <p:cNvSpPr/>
+          <p:nvPr/>
+        </p:nvSpPr>
+        <p:spPr>
+          <a:xfrm>
+            <a:off x="5393789" y="1247289"/>
+            <a:ext cx="1834588" cy="1782501"/>
+          </a:xfrm>
+          <a:prstGeom prst="rect">
+            <a:avLst/>
+          </a:prstGeom>
+          <a:solidFill>
+            <a:schemeClr val="accent1"/>
+          </a:solidFill>
+        </p:spPr>
+        <p:style>
+          <a:lnRef idx="2">
+            <a:schemeClr val="accent1">
+              <a:shade val="15000"/>
+            </a:schemeClr>
+          </a:lnRef>
+          <a:fillRef idx="1">
+            <a:schemeClr val="accent1"/>
+          </a:fillRef>
+          <a:effectRef idx="0">
+            <a:schemeClr val="accent1"/>
+          </a:effectRef>
+          <a:fontRef idx="minor">
+            <a:schemeClr val="lt1"/>
+          </a:fontRef>
+        </p:style>
+        <p:txBody>
+          <a:bodyPr rtlCol="0" anchor="ctr"/>
+          <a:lstStyle/>
+          <a:p>
+            <a:pPr algn="ctr"/>
+            <a:endParaRPr lang="en-GB"/>
+          </a:p>
+        </p:txBody>
+      </p:sp>
+      <p:sp>
+        <p:nvSpPr>
+          <p:cNvPr id="5" name="Rectangle 4">
+            <a:extLst>
+              <a:ext uri="{FF2B5EF4-FFF2-40B4-BE49-F238E27FC236}">
+                <a16:creationId xmlns:a16="http://schemas.microsoft.com/office/drawing/2014/main" id="{EEBD08A2-D0D8-E563-BDFA-2D93F8CF1BE6}"/>
+              </a:ext>
+            </a:extLst>
+          </p:cNvPr>
+          <p:cNvSpPr/>
+          <p:nvPr/>
+        </p:nvSpPr>
+        <p:spPr>
+          <a:xfrm>
+            <a:off x="7714526" y="1258017"/>
+            <a:ext cx="1834588" cy="1782501"/>
+          </a:xfrm>
+          <a:prstGeom prst="rect">
+            <a:avLst/>
+          </a:prstGeom>
+          <a:solidFill>
+            <a:schemeClr val="accent2"/>
+          </a:solidFill>
+        </p:spPr>
+        <p:style>
+          <a:lnRef idx="2">
+            <a:schemeClr val="accent1">
+              <a:shade val="15000"/>
+            </a:schemeClr>
+          </a:lnRef>
+          <a:fillRef idx="1">
+            <a:schemeClr val="accent1"/>
+          </a:fillRef>
+          <a:effectRef idx="0">
+            <a:schemeClr val="accent1"/>
+          </a:effectRef>
+          <a:fontRef idx="minor">
+            <a:schemeClr val="lt1"/>
+          </a:fontRef>
+        </p:style>
+        <p:txBody>
+          <a:bodyPr rtlCol="0" anchor="ctr"/>
+          <a:lstStyle/>
+          <a:p>
+            <a:pPr algn="ctr"/>
+            <a:endParaRPr lang="en-GB"/>
+          </a:p>
+        </p:txBody>
+      </p:sp>
+      <p:sp>
+        <p:nvSpPr>
+          <p:cNvPr id="6" name="Rectangle 5">
+            <a:extLst>
+              <a:ext uri="{FF2B5EF4-FFF2-40B4-BE49-F238E27FC236}">
+                <a16:creationId xmlns:a16="http://schemas.microsoft.com/office/drawing/2014/main" id="{E5F42BF5-523E-9E4F-1351-870F9CB9D30B}"/>
+              </a:ext>
+            </a:extLst>
+          </p:cNvPr>
+          <p:cNvSpPr/>
+          <p:nvPr/>
+        </p:nvSpPr>
+        <p:spPr>
+          <a:xfrm>
+            <a:off x="752317" y="3241897"/>
+            <a:ext cx="1834588" cy="1782501"/>
+          </a:xfrm>
+          <a:prstGeom prst="rect">
+            <a:avLst/>
+          </a:prstGeom>
+          <a:solidFill>
+            <a:schemeClr val="accent3"/>
+          </a:solidFill>
+        </p:spPr>
+        <p:style>
+          <a:lnRef idx="2">
+            <a:schemeClr val="accent1">
+              <a:shade val="15000"/>
+            </a:schemeClr>
+          </a:lnRef>
+          <a:fillRef idx="1">
+            <a:schemeClr val="accent1"/>
+          </a:fillRef>
+          <a:effectRef idx="0">
+            <a:schemeClr val="accent1"/>
+          </a:effectRef>
+          <a:fontRef idx="minor">
+            <a:schemeClr val="lt1"/>
+          </a:fontRef>
+        </p:style>
+        <p:txBody>
+          <a:bodyPr rtlCol="0" anchor="ctr"/>
+          <a:lstStyle/>
+          <a:p>
+            <a:pPr algn="ctr"/>
+            <a:endParaRPr lang="en-GB"/>
+          </a:p>
+        </p:txBody>
+      </p:sp>
+      <p:sp>
+        <p:nvSpPr>
+          <p:cNvPr id="7" name="Rectangle 6">
+            <a:extLst>
+              <a:ext uri="{FF2B5EF4-FFF2-40B4-BE49-F238E27FC236}">
+                <a16:creationId xmlns:a16="http://schemas.microsoft.com/office/drawing/2014/main" id="{AD9FDAD2-09A9-AC56-613F-AA84467F7A8C}"/>
+              </a:ext>
+            </a:extLst>
+          </p:cNvPr>
+          <p:cNvSpPr/>
+          <p:nvPr/>
+        </p:nvSpPr>
+        <p:spPr>
+          <a:xfrm>
+            <a:off x="3073053" y="3241898"/>
+            <a:ext cx="1834588" cy="1782501"/>
+          </a:xfrm>
+          <a:prstGeom prst="rect">
+            <a:avLst/>
+          </a:prstGeom>
+          <a:solidFill>
+            <a:schemeClr val="accent4"/>
+          </a:solidFill>
+        </p:spPr>
+        <p:style>
+          <a:lnRef idx="2">
+            <a:schemeClr val="accent1">
+              <a:shade val="15000"/>
+            </a:schemeClr>
+          </a:lnRef>
+          <a:fillRef idx="1">
+            <a:schemeClr val="accent1"/>
+          </a:fillRef>
+          <a:effectRef idx="0">
+            <a:schemeClr val="accent1"/>
+          </a:effectRef>
+          <a:fontRef idx="minor">
+            <a:schemeClr val="lt1"/>
+          </a:fontRef>
+        </p:style>
+        <p:txBody>
+          <a:bodyPr rtlCol="0" anchor="ctr"/>
+          <a:lstStyle/>
+          <a:p>
+            <a:pPr algn="ctr"/>
+            <a:endParaRPr lang="en-GB"/>
+          </a:p>
+        </p:txBody>
+      </p:sp>
+      <p:sp>
+        <p:nvSpPr>
+          <p:cNvPr id="8" name="Rectangle 7">
+            <a:extLst>
+              <a:ext uri="{FF2B5EF4-FFF2-40B4-BE49-F238E27FC236}">
+                <a16:creationId xmlns:a16="http://schemas.microsoft.com/office/drawing/2014/main" id="{E008B1CF-FBB0-8ABA-4366-BC70FDEA408A}"/>
+              </a:ext>
+            </a:extLst>
+          </p:cNvPr>
+          <p:cNvSpPr/>
+          <p:nvPr/>
+        </p:nvSpPr>
+        <p:spPr>
+          <a:xfrm>
+            <a:off x="5393789" y="3241899"/>
+            <a:ext cx="1834588" cy="1782501"/>
+          </a:xfrm>
+          <a:prstGeom prst="rect">
+            <a:avLst/>
+          </a:prstGeom>
+          <a:solidFill>
+            <a:schemeClr val="accent5"/>
+          </a:solidFill>
+        </p:spPr>
+        <p:style>
+          <a:lnRef idx="2">
+            <a:schemeClr val="accent1">
+              <a:shade val="15000"/>
+            </a:schemeClr>
+          </a:lnRef>
+          <a:fillRef idx="1">
+            <a:schemeClr val="accent1"/>
+          </a:fillRef>
+          <a:effectRef idx="0">
+            <a:schemeClr val="accent1"/>
+          </a:effectRef>
+          <a:fontRef idx="minor">
+            <a:schemeClr val="lt1"/>
+          </a:fontRef>
+        </p:style>
+        <p:txBody>
+          <a:bodyPr rtlCol="0" anchor="ctr"/>
+          <a:lstStyle/>
+          <a:p>
+            <a:pPr algn="ctr"/>
+            <a:endParaRPr lang="en-GB"/>
+          </a:p>
+        </p:txBody>
+      </p:sp>
+      <p:sp>
+        <p:nvSpPr>
+          <p:cNvPr id="10" name="Rectangle 9">
+            <a:extLst>
+              <a:ext uri="{FF2B5EF4-FFF2-40B4-BE49-F238E27FC236}">
+                <a16:creationId xmlns:a16="http://schemas.microsoft.com/office/drawing/2014/main" id="{D1D81ADB-0DFD-BD29-2781-E22C6040DD2E}"/>
+              </a:ext>
+            </a:extLst>
+          </p:cNvPr>
+          <p:cNvSpPr/>
+          <p:nvPr/>
+        </p:nvSpPr>
+        <p:spPr>
+          <a:xfrm>
+            <a:off x="7714526" y="3252627"/>
+            <a:ext cx="1834588" cy="1782501"/>
+          </a:xfrm>
+          <a:prstGeom prst="rect">
+            <a:avLst/>
+          </a:prstGeom>
+          <a:solidFill>
+            <a:schemeClr val="accent6"/>
+          </a:solidFill>
+        </p:spPr>
+        <p:style>
+          <a:lnRef idx="2">
+            <a:schemeClr val="accent1">
+              <a:shade val="15000"/>
+            </a:schemeClr>
+          </a:lnRef>
+          <a:fillRef idx="1">
+            <a:schemeClr val="accent1"/>
+          </a:fillRef>
+          <a:effectRef idx="0">
+            <a:schemeClr val="accent1"/>
+          </a:effectRef>
+          <a:fontRef idx="minor">
+            <a:schemeClr val="lt1"/>
+          </a:fontRef>
+        </p:style>
+        <p:txBody>
+          <a:bodyPr rtlCol="0" anchor="ctr"/>
+          <a:lstStyle/>
+          <a:p>
+            <a:pPr algn="ctr"/>
+            <a:endParaRPr lang="en-GB"/>
+          </a:p>
+        </p:txBody>
+      </p:sp>
     </p:spTree>
     <p:extLst>
       <p:ext uri="{BB962C8B-B14F-4D97-AF65-F5344CB8AC3E}">
@@ -4450,7 +4961,7 @@
         </p:nvSpPr>
         <p:spPr>
           <a:xfrm>
-            <a:off x="6436425" y="332509"/>
+            <a:off x="6428427" y="270103"/>
             <a:ext cx="55423" cy="6371112"/>
           </a:xfrm>
           <a:prstGeom prst="rect">
@@ -4665,7 +5176,7 @@
         </p:nvSpPr>
         <p:spPr>
           <a:xfrm>
-            <a:off x="-1" y="0"/>
+            <a:off x="-4236" y="-89536"/>
             <a:ext cx="12192001" cy="666627"/>
           </a:xfrm>
           <a:custGeom>

</xml_diff>